<commit_message>
Added Jim's head shot to the gallery.
</commit_message>
<xml_diff>
--- a/head-shots/gallery.pptx
+++ b/head-shots/gallery.pptx
@@ -267,7 +267,7 @@
           <a:p>
             <a:fld id="{0B842F42-2CE9-4E35-95C1-410DC08A50B1}" type="datetimeFigureOut">
               <a:rPr lang="en-US" smtClean="0"/>
-              <a:t>3/21/2021</a:t>
+              <a:t>4/6/2021</a:t>
             </a:fld>
             <a:endParaRPr lang="en-US"/>
           </a:p>
@@ -432,7 +432,7 @@
           <a:p>
             <a:fld id="{6F282904-F315-4730-8D91-37D99E141A6F}" type="datetimeFigureOut">
               <a:rPr lang="en-US" smtClean="0"/>
-              <a:t>3/21/2021</a:t>
+              <a:t>4/6/2021</a:t>
             </a:fld>
             <a:endParaRPr lang="en-US"/>
           </a:p>
@@ -4111,6 +4111,103 @@
           </p:spPr>
         </p:pic>
       </p:grpSp>
+      <p:grpSp>
+        <p:nvGrpSpPr>
+          <p:cNvPr id="5" name="Group 4">
+            <a:extLst>
+              <a:ext uri="{FF2B5EF4-FFF2-40B4-BE49-F238E27FC236}">
+                <a16:creationId xmlns:a16="http://schemas.microsoft.com/office/drawing/2014/main" id="{597A4AFB-B272-4C06-894E-4F58BD576B2F}"/>
+              </a:ext>
+            </a:extLst>
+          </p:cNvPr>
+          <p:cNvGrpSpPr/>
+          <p:nvPr/>
+        </p:nvGrpSpPr>
+        <p:grpSpPr>
+          <a:xfrm>
+            <a:off x="7480167" y="1192331"/>
+            <a:ext cx="1038027" cy="1556198"/>
+            <a:chOff x="7480167" y="1192331"/>
+            <a:chExt cx="1038027" cy="1556198"/>
+          </a:xfrm>
+        </p:grpSpPr>
+        <p:pic>
+          <p:nvPicPr>
+            <p:cNvPr id="3" name="Picture 2">
+              <a:extLst>
+                <a:ext uri="{FF2B5EF4-FFF2-40B4-BE49-F238E27FC236}">
+                  <a16:creationId xmlns:a16="http://schemas.microsoft.com/office/drawing/2014/main" id="{163A98AC-09C7-44E6-9A5D-5D958632DE90}"/>
+                </a:ext>
+              </a:extLst>
+            </p:cNvPr>
+            <p:cNvPicPr>
+              <a:picLocks noChangeAspect="1"/>
+            </p:cNvPicPr>
+            <p:nvPr/>
+          </p:nvPicPr>
+          <p:blipFill>
+            <a:blip r:embed="rId8" cstate="print">
+              <a:extLst>
+                <a:ext uri="{28A0092B-C50C-407E-A947-70E740481C1C}">
+                  <a14:useLocalDpi xmlns:a14="http://schemas.microsoft.com/office/drawing/2010/main" val="0"/>
+                </a:ext>
+              </a:extLst>
+            </a:blip>
+            <a:stretch>
+              <a:fillRect/>
+            </a:stretch>
+          </p:blipFill>
+          <p:spPr>
+            <a:xfrm>
+              <a:off x="7480167" y="1192331"/>
+              <a:ext cx="1038027" cy="1207008"/>
+            </a:xfrm>
+            <a:prstGeom prst="rect">
+              <a:avLst/>
+            </a:prstGeom>
+          </p:spPr>
+        </p:pic>
+        <p:sp>
+          <p:nvSpPr>
+            <p:cNvPr id="25" name="TextBox 24">
+              <a:extLst>
+                <a:ext uri="{FF2B5EF4-FFF2-40B4-BE49-F238E27FC236}">
+                  <a16:creationId xmlns:a16="http://schemas.microsoft.com/office/drawing/2014/main" id="{2BF5CC8F-0019-4B7E-86BD-8DD2362D88C0}"/>
+                </a:ext>
+              </a:extLst>
+            </p:cNvPr>
+            <p:cNvSpPr txBox="1"/>
+            <p:nvPr/>
+          </p:nvSpPr>
+          <p:spPr>
+            <a:xfrm>
+              <a:off x="7624718" y="2406897"/>
+              <a:ext cx="748924" cy="341632"/>
+            </a:xfrm>
+            <a:prstGeom prst="rect">
+              <a:avLst/>
+            </a:prstGeom>
+            <a:noFill/>
+          </p:spPr>
+          <p:txBody>
+            <a:bodyPr wrap="none" rtlCol="0">
+              <a:spAutoFit/>
+            </a:bodyPr>
+            <a:lstStyle/>
+            <a:p>
+              <a:pPr algn="ctr">
+                <a:lnSpc>
+                  <a:spcPct val="90000"/>
+                </a:lnSpc>
+              </a:pPr>
+              <a:r>
+                <a:rPr lang="en-US" dirty="0"/>
+                <a:t>James</a:t>
+              </a:r>
+            </a:p>
+          </p:txBody>
+        </p:sp>
+      </p:grpSp>
     </p:spTree>
     <p:extLst>
       <p:ext uri="{BB962C8B-B14F-4D97-AF65-F5344CB8AC3E}">
@@ -5037,9 +5134,12 @@
 </file>
 
 <file path=customXml/item1.xml><?xml version="1.0" encoding="utf-8"?>
-<p:properties xmlns:p="http://schemas.microsoft.com/office/2006/metadata/properties" xmlns:xsi="http://www.w3.org/2001/XMLSchema-instance" xmlns:pc="http://schemas.microsoft.com/office/infopath/2007/PartnerControls">
-  <documentManagement/>
-</p:properties>
+<?mso-contentType ?>
+<FormTemplates xmlns="http://schemas.microsoft.com/sharepoint/v3/contenttype/forms">
+  <Display>DocumentLibraryForm</Display>
+  <Edit>DocumentLibraryForm</Edit>
+  <New>DocumentLibraryForm</New>
+</FormTemplates>
 </file>
 
 <file path=customXml/item2.xml><?xml version="1.0" encoding="utf-8"?>
@@ -5092,25 +5192,15 @@
 </file>
 
 <file path=customXml/item3.xml><?xml version="1.0" encoding="utf-8"?>
-<?mso-contentType ?>
-<FormTemplates xmlns="http://schemas.microsoft.com/sharepoint/v3/contenttype/forms">
-  <Display>DocumentLibraryForm</Display>
-  <Edit>DocumentLibraryForm</Edit>
-  <New>DocumentLibraryForm</New>
-</FormTemplates>
+<p:properties xmlns:p="http://schemas.microsoft.com/office/2006/metadata/properties" xmlns:xsi="http://www.w3.org/2001/XMLSchema-instance" xmlns:pc="http://schemas.microsoft.com/office/infopath/2007/PartnerControls">
+  <documentManagement/>
+</p:properties>
 </file>
 
 <file path=customXml/itemProps1.xml><?xml version="1.0" encoding="utf-8"?>
-<ds:datastoreItem xmlns:ds="http://schemas.openxmlformats.org/officeDocument/2006/customXml" ds:itemID="{A50EC660-24D0-43A0-AE5E-E274115E726B}">
+<ds:datastoreItem xmlns:ds="http://schemas.openxmlformats.org/officeDocument/2006/customXml" ds:itemID="{19E20559-B232-4371-8690-E3D8007EDB82}">
   <ds:schemaRefs>
-    <ds:schemaRef ds:uri="http://purl.org/dc/elements/1.1/"/>
-    <ds:schemaRef ds:uri="http://schemas.microsoft.com/office/2006/metadata/properties"/>
-    <ds:schemaRef ds:uri="http://purl.org/dc/terms/"/>
-    <ds:schemaRef ds:uri="http://schemas.openxmlformats.org/package/2006/metadata/core-properties"/>
-    <ds:schemaRef ds:uri="http://schemas.microsoft.com/office/2006/documentManagement/types"/>
-    <ds:schemaRef ds:uri="http://www.w3.org/XML/1998/namespace"/>
-    <ds:schemaRef ds:uri="http://purl.org/dc/dcmitype/"/>
-    <ds:schemaRef ds:uri="http://schemas.microsoft.com/office/infopath/2007/PartnerControls"/>
+    <ds:schemaRef ds:uri="http://schemas.microsoft.com/sharepoint/v3/contenttype/forms"/>
   </ds:schemaRefs>
 </ds:datastoreItem>
 </file>
@@ -5131,9 +5221,16 @@
 </file>
 
 <file path=customXml/itemProps3.xml><?xml version="1.0" encoding="utf-8"?>
-<ds:datastoreItem xmlns:ds="http://schemas.openxmlformats.org/officeDocument/2006/customXml" ds:itemID="{19E20559-B232-4371-8690-E3D8007EDB82}">
+<ds:datastoreItem xmlns:ds="http://schemas.openxmlformats.org/officeDocument/2006/customXml" ds:itemID="{A50EC660-24D0-43A0-AE5E-E274115E726B}">
   <ds:schemaRefs>
-    <ds:schemaRef ds:uri="http://schemas.microsoft.com/sharepoint/v3/contenttype/forms"/>
+    <ds:schemaRef ds:uri="http://purl.org/dc/elements/1.1/"/>
+    <ds:schemaRef ds:uri="http://schemas.microsoft.com/office/2006/metadata/properties"/>
+    <ds:schemaRef ds:uri="http://purl.org/dc/terms/"/>
+    <ds:schemaRef ds:uri="http://schemas.openxmlformats.org/package/2006/metadata/core-properties"/>
+    <ds:schemaRef ds:uri="http://schemas.microsoft.com/office/2006/documentManagement/types"/>
+    <ds:schemaRef ds:uri="http://www.w3.org/XML/1998/namespace"/>
+    <ds:schemaRef ds:uri="http://purl.org/dc/dcmitype/"/>
+    <ds:schemaRef ds:uri="http://schemas.microsoft.com/office/infopath/2007/PartnerControls"/>
   </ds:schemaRefs>
 </ds:datastoreItem>
 </file>
</xml_diff>

<commit_message>
Added pronouns to the presenter gallery images.
</commit_message>
<xml_diff>
--- a/head-shots/gallery.pptx
+++ b/head-shots/gallery.pptx
@@ -267,7 +267,7 @@
           <a:p>
             <a:fld id="{0B842F42-2CE9-4E35-95C1-410DC08A50B1}" type="datetimeFigureOut">
               <a:rPr lang="en-US" smtClean="0"/>
-              <a:t>4/6/2021</a:t>
+              <a:t>6/14/2021</a:t>
             </a:fld>
             <a:endParaRPr lang="en-US"/>
           </a:p>
@@ -432,7 +432,7 @@
           <a:p>
             <a:fld id="{6F282904-F315-4730-8D91-37D99E141A6F}" type="datetimeFigureOut">
               <a:rPr lang="en-US" smtClean="0"/>
-              <a:t>4/6/2021</a:t>
+              <a:t>6/14/2021</a:t>
             </a:fld>
             <a:endParaRPr lang="en-US"/>
           </a:p>
@@ -3553,10 +3553,10 @@
         </p:nvGrpSpPr>
         <p:grpSpPr>
           <a:xfrm>
-            <a:off x="2831701" y="1192331"/>
-            <a:ext cx="1009507" cy="1594132"/>
-            <a:chOff x="8066532" y="1374891"/>
-            <a:chExt cx="1009507" cy="1594132"/>
+            <a:off x="2818231" y="1192331"/>
+            <a:ext cx="1009507" cy="1851663"/>
+            <a:chOff x="8066531" y="1374891"/>
+            <a:chExt cx="1009507" cy="1851663"/>
           </a:xfrm>
         </p:grpSpPr>
         <p:pic>
@@ -3608,8 +3608,8 @@
           </p:nvSpPr>
           <p:spPr>
             <a:xfrm>
-              <a:off x="8066532" y="2535058"/>
-              <a:ext cx="1009507" cy="433965"/>
+              <a:off x="8066531" y="2543290"/>
+              <a:ext cx="1009507" cy="683264"/>
             </a:xfrm>
             <a:prstGeom prst="rect">
               <a:avLst/>
@@ -3632,6 +3632,17 @@
                 <a:t>Patricia</a:t>
               </a:r>
             </a:p>
+            <a:p>
+              <a:pPr algn="l">
+                <a:lnSpc>
+                  <a:spcPct val="90000"/>
+                </a:lnSpc>
+              </a:pPr>
+              <a:r>
+                <a:rPr lang="en-US" i="1" dirty="0"/>
+                <a:t>she/her</a:t>
+              </a:r>
+            </a:p>
           </p:txBody>
         </p:sp>
       </p:grpSp>
@@ -3649,10 +3660,10 @@
         </p:nvGrpSpPr>
         <p:grpSpPr>
           <a:xfrm>
-            <a:off x="3994009" y="1192331"/>
-            <a:ext cx="933420" cy="1556563"/>
-            <a:chOff x="9948840" y="348151"/>
-            <a:chExt cx="933420" cy="1556563"/>
+            <a:off x="3955887" y="1192331"/>
+            <a:ext cx="1009507" cy="1851663"/>
+            <a:chOff x="9969639" y="348151"/>
+            <a:chExt cx="1009507" cy="1851663"/>
           </a:xfrm>
         </p:grpSpPr>
         <p:pic>
@@ -3683,7 +3694,7 @@
           </p:blipFill>
           <p:spPr>
             <a:xfrm>
-              <a:off x="9948840" y="348151"/>
+              <a:off x="10007683" y="348151"/>
               <a:ext cx="933420" cy="1207008"/>
             </a:xfrm>
             <a:prstGeom prst="rect">
@@ -3705,8 +3716,8 @@
           </p:nvSpPr>
           <p:spPr>
             <a:xfrm>
-              <a:off x="10000565" y="1566386"/>
-              <a:ext cx="829971" cy="338328"/>
+              <a:off x="9969639" y="1516550"/>
+              <a:ext cx="1009507" cy="683264"/>
             </a:xfrm>
             <a:prstGeom prst="rect">
               <a:avLst/>
@@ -3719,7 +3730,7 @@
             </a:bodyPr>
             <a:lstStyle/>
             <a:p>
-              <a:pPr algn="l">
+              <a:pPr algn="ctr">
                 <a:lnSpc>
                   <a:spcPct val="90000"/>
                 </a:lnSpc>
@@ -3727,6 +3738,17 @@
               <a:r>
                 <a:rPr lang="en-US" dirty="0"/>
                 <a:t>Rinku</a:t>
+              </a:r>
+            </a:p>
+            <a:p>
+              <a:pPr algn="ctr">
+                <a:lnSpc>
+                  <a:spcPct val="90000"/>
+                </a:lnSpc>
+              </a:pPr>
+              <a:r>
+                <a:rPr lang="en-US" i="1" dirty="0"/>
+                <a:t>she/her</a:t>
               </a:r>
             </a:p>
           </p:txBody>
@@ -3746,10 +3768,10 @@
         </p:nvGrpSpPr>
         <p:grpSpPr>
           <a:xfrm>
-            <a:off x="5080230" y="1192331"/>
-            <a:ext cx="1124923" cy="1551517"/>
-            <a:chOff x="10097113" y="1410772"/>
-            <a:chExt cx="1124923" cy="1551517"/>
+            <a:off x="5093543" y="1192331"/>
+            <a:ext cx="1124923" cy="1851663"/>
+            <a:chOff x="10145555" y="1410772"/>
+            <a:chExt cx="1124923" cy="1851663"/>
           </a:xfrm>
         </p:grpSpPr>
         <p:pic>
@@ -3779,7 +3801,7 @@
           </p:blipFill>
           <p:spPr>
             <a:xfrm>
-              <a:off x="10160663" y="1410772"/>
+              <a:off x="10209105" y="1410772"/>
               <a:ext cx="997822" cy="1207008"/>
             </a:xfrm>
             <a:prstGeom prst="rect">
@@ -3801,8 +3823,8 @@
           </p:nvSpPr>
           <p:spPr>
             <a:xfrm>
-              <a:off x="10097113" y="2623961"/>
-              <a:ext cx="1124923" cy="338328"/>
+              <a:off x="10145555" y="2579171"/>
+              <a:ext cx="1124923" cy="683264"/>
             </a:xfrm>
             <a:prstGeom prst="rect">
               <a:avLst/>
@@ -3815,7 +3837,7 @@
             </a:bodyPr>
             <a:lstStyle/>
             <a:p>
-              <a:pPr algn="l">
+              <a:pPr algn="ctr">
                 <a:lnSpc>
                   <a:spcPct val="90000"/>
                 </a:lnSpc>
@@ -3823,6 +3845,17 @@
               <a:r>
                 <a:rPr lang="en-US" dirty="0"/>
                 <a:t>Deborah</a:t>
+              </a:r>
+            </a:p>
+            <a:p>
+              <a:pPr algn="ctr">
+                <a:lnSpc>
+                  <a:spcPct val="90000"/>
+                </a:lnSpc>
+              </a:pPr>
+              <a:r>
+                <a:rPr lang="en-US" i="1" dirty="0"/>
+                <a:t>she/her</a:t>
               </a:r>
             </a:p>
           </p:txBody>
@@ -3843,9 +3876,9 @@
         <p:grpSpPr>
           <a:xfrm>
             <a:off x="610004" y="1192331"/>
-            <a:ext cx="997822" cy="1556198"/>
+            <a:ext cx="997822" cy="1805497"/>
             <a:chOff x="5234821" y="1346049"/>
-            <a:chExt cx="997822" cy="1556198"/>
+            <a:chExt cx="997822" cy="1805497"/>
           </a:xfrm>
         </p:grpSpPr>
         <p:pic>
@@ -3892,7 +3925,7 @@
           <p:spPr>
             <a:xfrm>
               <a:off x="5237443" y="2560615"/>
-              <a:ext cx="992579" cy="341632"/>
+              <a:ext cx="992579" cy="590931"/>
             </a:xfrm>
             <a:prstGeom prst="rect">
               <a:avLst/>
@@ -3915,6 +3948,17 @@
                 <a:t>David B</a:t>
               </a:r>
             </a:p>
+            <a:p>
+              <a:pPr algn="ctr">
+                <a:lnSpc>
+                  <a:spcPct val="90000"/>
+                </a:lnSpc>
+              </a:pPr>
+              <a:r>
+                <a:rPr lang="en-US" i="1" dirty="0"/>
+                <a:t>he/him</a:t>
+              </a:r>
+            </a:p>
           </p:txBody>
         </p:sp>
       </p:grpSp>
@@ -3932,10 +3976,10 @@
         </p:nvGrpSpPr>
         <p:grpSpPr>
           <a:xfrm>
-            <a:off x="6357953" y="1192331"/>
-            <a:ext cx="1005404" cy="1556198"/>
+            <a:off x="6346615" y="1192331"/>
+            <a:ext cx="1005403" cy="1805497"/>
             <a:chOff x="10526802" y="1346049"/>
-            <a:chExt cx="1005404" cy="1556198"/>
+            <a:chExt cx="1005403" cy="1805497"/>
           </a:xfrm>
         </p:grpSpPr>
         <p:pic>
@@ -3988,7 +4032,7 @@
           <p:spPr>
             <a:xfrm>
               <a:off x="10526802" y="2560615"/>
-              <a:ext cx="1005404" cy="341632"/>
+              <a:ext cx="1005403" cy="590931"/>
             </a:xfrm>
             <a:prstGeom prst="rect">
               <a:avLst/>
@@ -4011,6 +4055,17 @@
                 <a:t>David R</a:t>
               </a:r>
             </a:p>
+            <a:p>
+              <a:pPr algn="ctr">
+                <a:lnSpc>
+                  <a:spcPct val="90000"/>
+                </a:lnSpc>
+              </a:pPr>
+              <a:r>
+                <a:rPr lang="en-US" i="1" dirty="0"/>
+                <a:t>he/him</a:t>
+              </a:r>
+            </a:p>
           </p:txBody>
         </p:sp>
       </p:grpSp>
@@ -4028,10 +4083,10 @@
         </p:nvGrpSpPr>
         <p:grpSpPr>
           <a:xfrm>
-            <a:off x="1760627" y="1192331"/>
-            <a:ext cx="918273" cy="1556198"/>
-            <a:chOff x="6632063" y="1346049"/>
-            <a:chExt cx="918273" cy="1556198"/>
+            <a:off x="1735975" y="1192331"/>
+            <a:ext cx="954107" cy="1805497"/>
+            <a:chOff x="6614147" y="1346049"/>
+            <a:chExt cx="954107" cy="1805497"/>
           </a:xfrm>
         </p:grpSpPr>
         <p:sp>
@@ -4048,8 +4103,8 @@
           </p:nvSpPr>
           <p:spPr>
             <a:xfrm>
-              <a:off x="6671854" y="2560615"/>
-              <a:ext cx="838691" cy="341632"/>
+              <a:off x="6614147" y="2560615"/>
+              <a:ext cx="954107" cy="590931"/>
             </a:xfrm>
             <a:prstGeom prst="rect">
               <a:avLst/>
@@ -4070,6 +4125,17 @@
               <a:r>
                 <a:rPr lang="en-US" dirty="0"/>
                 <a:t>Anshu</a:t>
+              </a:r>
+            </a:p>
+            <a:p>
+              <a:pPr algn="ctr">
+                <a:lnSpc>
+                  <a:spcPct val="90000"/>
+                </a:lnSpc>
+              </a:pPr>
+              <a:r>
+                <a:rPr lang="en-US" i="1" dirty="0"/>
+                <a:t>she/her</a:t>
               </a:r>
             </a:p>
           </p:txBody>
@@ -4126,9 +4192,9 @@
         <p:grpSpPr>
           <a:xfrm>
             <a:off x="7480167" y="1192331"/>
-            <a:ext cx="1038027" cy="1556198"/>
+            <a:ext cx="1038027" cy="1796021"/>
             <a:chOff x="7480167" y="1192331"/>
-            <a:chExt cx="1038027" cy="1556198"/>
+            <a:chExt cx="1038027" cy="1796021"/>
           </a:xfrm>
         </p:grpSpPr>
         <p:pic>
@@ -4181,8 +4247,8 @@
           </p:nvSpPr>
           <p:spPr>
             <a:xfrm>
-              <a:off x="7624718" y="2406897"/>
-              <a:ext cx="748924" cy="341632"/>
+              <a:off x="7560598" y="2397421"/>
+              <a:ext cx="877164" cy="590931"/>
             </a:xfrm>
             <a:prstGeom prst="rect">
               <a:avLst/>
@@ -4203,6 +4269,225 @@
               <a:r>
                 <a:rPr lang="en-US" dirty="0"/>
                 <a:t>James</a:t>
+              </a:r>
+            </a:p>
+            <a:p>
+              <a:pPr algn="ctr">
+                <a:lnSpc>
+                  <a:spcPct val="90000"/>
+                </a:lnSpc>
+              </a:pPr>
+              <a:r>
+                <a:rPr lang="en-US" i="1" dirty="0"/>
+                <a:t>he/him</a:t>
+              </a:r>
+            </a:p>
+          </p:txBody>
+        </p:sp>
+      </p:grpSp>
+      <p:grpSp>
+        <p:nvGrpSpPr>
+          <p:cNvPr id="35" name="Group 34">
+            <a:extLst>
+              <a:ext uri="{FF2B5EF4-FFF2-40B4-BE49-F238E27FC236}">
+                <a16:creationId xmlns:a16="http://schemas.microsoft.com/office/drawing/2014/main" id="{9CBA525B-BC9E-4C06-BF38-51B900AA6D8C}"/>
+              </a:ext>
+            </a:extLst>
+          </p:cNvPr>
+          <p:cNvGrpSpPr/>
+          <p:nvPr/>
+        </p:nvGrpSpPr>
+        <p:grpSpPr>
+          <a:xfrm>
+            <a:off x="604754" y="3154610"/>
+            <a:ext cx="997822" cy="1805497"/>
+            <a:chOff x="5234821" y="1346049"/>
+            <a:chExt cx="997822" cy="1805497"/>
+          </a:xfrm>
+        </p:grpSpPr>
+        <p:pic>
+          <p:nvPicPr>
+            <p:cNvPr id="36" name="Picture 35">
+              <a:extLst>
+                <a:ext uri="{FF2B5EF4-FFF2-40B4-BE49-F238E27FC236}">
+                  <a16:creationId xmlns:a16="http://schemas.microsoft.com/office/drawing/2014/main" id="{17A1D811-B247-41C3-921F-6845D08362C7}"/>
+                </a:ext>
+              </a:extLst>
+            </p:cNvPr>
+            <p:cNvPicPr>
+              <a:picLocks noChangeAspect="1"/>
+            </p:cNvPicPr>
+            <p:nvPr/>
+          </p:nvPicPr>
+          <p:blipFill rotWithShape="1">
+            <a:blip r:embed="rId5"/>
+            <a:srcRect l="13222" t="5312" r="18595" b="32928"/>
+            <a:stretch/>
+          </p:blipFill>
+          <p:spPr>
+            <a:xfrm>
+              <a:off x="5234821" y="1346049"/>
+              <a:ext cx="997822" cy="1205090"/>
+            </a:xfrm>
+            <a:prstGeom prst="rect">
+              <a:avLst/>
+            </a:prstGeom>
+          </p:spPr>
+        </p:pic>
+        <p:sp>
+          <p:nvSpPr>
+            <p:cNvPr id="37" name="TextBox 36">
+              <a:extLst>
+                <a:ext uri="{FF2B5EF4-FFF2-40B4-BE49-F238E27FC236}">
+                  <a16:creationId xmlns:a16="http://schemas.microsoft.com/office/drawing/2014/main" id="{86784127-6192-49AF-B3B1-2E014218A462}"/>
+                </a:ext>
+              </a:extLst>
+            </p:cNvPr>
+            <p:cNvSpPr txBox="1"/>
+            <p:nvPr/>
+          </p:nvSpPr>
+          <p:spPr>
+            <a:xfrm>
+              <a:off x="5295151" y="2560615"/>
+              <a:ext cx="877163" cy="590931"/>
+            </a:xfrm>
+            <a:prstGeom prst="rect">
+              <a:avLst/>
+            </a:prstGeom>
+            <a:noFill/>
+          </p:spPr>
+          <p:txBody>
+            <a:bodyPr wrap="none" rtlCol="0">
+              <a:spAutoFit/>
+            </a:bodyPr>
+            <a:lstStyle/>
+            <a:p>
+              <a:pPr algn="ctr">
+                <a:lnSpc>
+                  <a:spcPct val="90000"/>
+                </a:lnSpc>
+              </a:pPr>
+              <a:r>
+                <a:rPr lang="en-US" dirty="0"/>
+                <a:t>David</a:t>
+              </a:r>
+            </a:p>
+            <a:p>
+              <a:pPr algn="ctr">
+                <a:lnSpc>
+                  <a:spcPct val="90000"/>
+                </a:lnSpc>
+              </a:pPr>
+              <a:r>
+                <a:rPr lang="en-US" i="1" dirty="0"/>
+                <a:t>he/him</a:t>
+              </a:r>
+            </a:p>
+          </p:txBody>
+        </p:sp>
+      </p:grpSp>
+      <p:grpSp>
+        <p:nvGrpSpPr>
+          <p:cNvPr id="38" name="Group 37">
+            <a:extLst>
+              <a:ext uri="{FF2B5EF4-FFF2-40B4-BE49-F238E27FC236}">
+                <a16:creationId xmlns:a16="http://schemas.microsoft.com/office/drawing/2014/main" id="{279EE72F-FF21-4B6E-B07A-B96B13F08636}"/>
+              </a:ext>
+            </a:extLst>
+          </p:cNvPr>
+          <p:cNvGrpSpPr/>
+          <p:nvPr/>
+        </p:nvGrpSpPr>
+        <p:grpSpPr>
+          <a:xfrm>
+            <a:off x="6377357" y="3154610"/>
+            <a:ext cx="933420" cy="1805497"/>
+            <a:chOff x="10562794" y="1346049"/>
+            <a:chExt cx="933420" cy="1805497"/>
+          </a:xfrm>
+        </p:grpSpPr>
+        <p:pic>
+          <p:nvPicPr>
+            <p:cNvPr id="39" name="Picture 38" descr="A person wearing glasses&#10;&#10;Description automatically generated with medium confidence">
+              <a:extLst>
+                <a:ext uri="{FF2B5EF4-FFF2-40B4-BE49-F238E27FC236}">
+                  <a16:creationId xmlns:a16="http://schemas.microsoft.com/office/drawing/2014/main" id="{14C05CDE-EBB0-42B6-B5FE-68D470E98D10}"/>
+                </a:ext>
+              </a:extLst>
+            </p:cNvPr>
+            <p:cNvPicPr>
+              <a:picLocks noChangeAspect="1"/>
+            </p:cNvPicPr>
+            <p:nvPr/>
+          </p:nvPicPr>
+          <p:blipFill rotWithShape="1">
+            <a:blip r:embed="rId6">
+              <a:extLst>
+                <a:ext uri="{28A0092B-C50C-407E-A947-70E740481C1C}">
+                  <a14:useLocalDpi xmlns:a14="http://schemas.microsoft.com/office/drawing/2010/main" val="0"/>
+                </a:ext>
+              </a:extLst>
+            </a:blip>
+            <a:srcRect l="12970" r="9695"/>
+            <a:stretch/>
+          </p:blipFill>
+          <p:spPr>
+            <a:xfrm>
+              <a:off x="10562794" y="1346049"/>
+              <a:ext cx="933420" cy="1207008"/>
+            </a:xfrm>
+            <a:prstGeom prst="rect">
+              <a:avLst/>
+            </a:prstGeom>
+          </p:spPr>
+        </p:pic>
+        <p:sp>
+          <p:nvSpPr>
+            <p:cNvPr id="40" name="TextBox 39">
+              <a:extLst>
+                <a:ext uri="{FF2B5EF4-FFF2-40B4-BE49-F238E27FC236}">
+                  <a16:creationId xmlns:a16="http://schemas.microsoft.com/office/drawing/2014/main" id="{91DE7068-958D-4FDB-9F15-F408DF70EF53}"/>
+                </a:ext>
+              </a:extLst>
+            </p:cNvPr>
+            <p:cNvSpPr txBox="1"/>
+            <p:nvPr/>
+          </p:nvSpPr>
+          <p:spPr>
+            <a:xfrm>
+              <a:off x="10590922" y="2560615"/>
+              <a:ext cx="877163" cy="590931"/>
+            </a:xfrm>
+            <a:prstGeom prst="rect">
+              <a:avLst/>
+            </a:prstGeom>
+            <a:noFill/>
+          </p:spPr>
+          <p:txBody>
+            <a:bodyPr wrap="none" rtlCol="0">
+              <a:spAutoFit/>
+            </a:bodyPr>
+            <a:lstStyle/>
+            <a:p>
+              <a:pPr algn="ctr">
+                <a:lnSpc>
+                  <a:spcPct val="90000"/>
+                </a:lnSpc>
+              </a:pPr>
+              <a:r>
+                <a:rPr lang="en-US" dirty="0"/>
+                <a:t>David</a:t>
+              </a:r>
+            </a:p>
+            <a:p>
+              <a:pPr algn="ctr">
+                <a:lnSpc>
+                  <a:spcPct val="90000"/>
+                </a:lnSpc>
+              </a:pPr>
+              <a:r>
+                <a:rPr lang="en-US" i="1" dirty="0"/>
+                <a:t>he/him</a:t>
               </a:r>
             </a:p>
           </p:txBody>
@@ -5134,12 +5419,9 @@
 </file>
 
 <file path=customXml/item1.xml><?xml version="1.0" encoding="utf-8"?>
-<?mso-contentType ?>
-<FormTemplates xmlns="http://schemas.microsoft.com/sharepoint/v3/contenttype/forms">
-  <Display>DocumentLibraryForm</Display>
-  <Edit>DocumentLibraryForm</Edit>
-  <New>DocumentLibraryForm</New>
-</FormTemplates>
+<p:properties xmlns:p="http://schemas.microsoft.com/office/2006/metadata/properties" xmlns:xsi="http://www.w3.org/2001/XMLSchema-instance" xmlns:pc="http://schemas.microsoft.com/office/infopath/2007/PartnerControls">
+  <documentManagement/>
+</p:properties>
 </file>
 
 <file path=customXml/item2.xml><?xml version="1.0" encoding="utf-8"?>
@@ -5192,15 +5474,25 @@
 </file>
 
 <file path=customXml/item3.xml><?xml version="1.0" encoding="utf-8"?>
-<p:properties xmlns:p="http://schemas.microsoft.com/office/2006/metadata/properties" xmlns:xsi="http://www.w3.org/2001/XMLSchema-instance" xmlns:pc="http://schemas.microsoft.com/office/infopath/2007/PartnerControls">
-  <documentManagement/>
-</p:properties>
+<?mso-contentType ?>
+<FormTemplates xmlns="http://schemas.microsoft.com/sharepoint/v3/contenttype/forms">
+  <Display>DocumentLibraryForm</Display>
+  <Edit>DocumentLibraryForm</Edit>
+  <New>DocumentLibraryForm</New>
+</FormTemplates>
 </file>
 
 <file path=customXml/itemProps1.xml><?xml version="1.0" encoding="utf-8"?>
-<ds:datastoreItem xmlns:ds="http://schemas.openxmlformats.org/officeDocument/2006/customXml" ds:itemID="{19E20559-B232-4371-8690-E3D8007EDB82}">
+<ds:datastoreItem xmlns:ds="http://schemas.openxmlformats.org/officeDocument/2006/customXml" ds:itemID="{A50EC660-24D0-43A0-AE5E-E274115E726B}">
   <ds:schemaRefs>
-    <ds:schemaRef ds:uri="http://schemas.microsoft.com/sharepoint/v3/contenttype/forms"/>
+    <ds:schemaRef ds:uri="http://purl.org/dc/elements/1.1/"/>
+    <ds:schemaRef ds:uri="http://schemas.microsoft.com/office/2006/metadata/properties"/>
+    <ds:schemaRef ds:uri="http://purl.org/dc/terms/"/>
+    <ds:schemaRef ds:uri="http://schemas.openxmlformats.org/package/2006/metadata/core-properties"/>
+    <ds:schemaRef ds:uri="http://schemas.microsoft.com/office/2006/documentManagement/types"/>
+    <ds:schemaRef ds:uri="http://www.w3.org/XML/1998/namespace"/>
+    <ds:schemaRef ds:uri="http://purl.org/dc/dcmitype/"/>
+    <ds:schemaRef ds:uri="http://schemas.microsoft.com/office/infopath/2007/PartnerControls"/>
   </ds:schemaRefs>
 </ds:datastoreItem>
 </file>
@@ -5221,16 +5513,9 @@
 </file>
 
 <file path=customXml/itemProps3.xml><?xml version="1.0" encoding="utf-8"?>
-<ds:datastoreItem xmlns:ds="http://schemas.openxmlformats.org/officeDocument/2006/customXml" ds:itemID="{A50EC660-24D0-43A0-AE5E-E274115E726B}">
+<ds:datastoreItem xmlns:ds="http://schemas.openxmlformats.org/officeDocument/2006/customXml" ds:itemID="{19E20559-B232-4371-8690-E3D8007EDB82}">
   <ds:schemaRefs>
-    <ds:schemaRef ds:uri="http://purl.org/dc/elements/1.1/"/>
-    <ds:schemaRef ds:uri="http://schemas.microsoft.com/office/2006/metadata/properties"/>
-    <ds:schemaRef ds:uri="http://purl.org/dc/terms/"/>
-    <ds:schemaRef ds:uri="http://schemas.openxmlformats.org/package/2006/metadata/core-properties"/>
-    <ds:schemaRef ds:uri="http://schemas.microsoft.com/office/2006/documentManagement/types"/>
-    <ds:schemaRef ds:uri="http://www.w3.org/XML/1998/namespace"/>
-    <ds:schemaRef ds:uri="http://purl.org/dc/dcmitype/"/>
-    <ds:schemaRef ds:uri="http://schemas.microsoft.com/office/infopath/2007/PartnerControls"/>
+    <ds:schemaRef ds:uri="http://schemas.microsoft.com/sharepoint/v3/contenttype/forms"/>
   </ds:schemaRefs>
 </ds:datastoreItem>
 </file>
</xml_diff>

<commit_message>
Add Boyana's head shot
</commit_message>
<xml_diff>
--- a/head-shots/gallery.pptx
+++ b/head-shots/gallery.pptx
@@ -267,7 +267,7 @@
           <a:p>
             <a:fld id="{0B842F42-2CE9-4E35-95C1-410DC08A50B1}" type="datetimeFigureOut">
               <a:rPr lang="en-US" smtClean="0"/>
-              <a:t>8/18/2021</a:t>
+              <a:t>7/26/2022</a:t>
             </a:fld>
             <a:endParaRPr lang="en-US"/>
           </a:p>
@@ -432,7 +432,7 @@
           <a:p>
             <a:fld id="{6F282904-F315-4730-8D91-37D99E141A6F}" type="datetimeFigureOut">
               <a:rPr lang="en-US" smtClean="0"/>
-              <a:t>8/18/2021</a:t>
+              <a:t>7/26/2022</a:t>
             </a:fld>
             <a:endParaRPr lang="en-US"/>
           </a:p>
@@ -4612,6 +4612,115 @@
           </p:txBody>
         </p:sp>
       </p:grpSp>
+      <p:grpSp>
+        <p:nvGrpSpPr>
+          <p:cNvPr id="14" name="Group 13">
+            <a:extLst>
+              <a:ext uri="{FF2B5EF4-FFF2-40B4-BE49-F238E27FC236}">
+                <a16:creationId xmlns:a16="http://schemas.microsoft.com/office/drawing/2014/main" id="{77250372-354C-41D9-A485-FF9F689D7DE2}"/>
+              </a:ext>
+            </a:extLst>
+          </p:cNvPr>
+          <p:cNvGrpSpPr/>
+          <p:nvPr/>
+        </p:nvGrpSpPr>
+        <p:grpSpPr>
+          <a:xfrm>
+            <a:off x="9737690" y="1188494"/>
+            <a:ext cx="1052623" cy="1797939"/>
+            <a:chOff x="9737690" y="1188494"/>
+            <a:chExt cx="1052623" cy="1797939"/>
+          </a:xfrm>
+        </p:grpSpPr>
+        <p:pic>
+          <p:nvPicPr>
+            <p:cNvPr id="8" name="Picture 7" descr="A person smiling for the camera&#10;&#10;Description automatically generated with medium confidence">
+              <a:extLst>
+                <a:ext uri="{FF2B5EF4-FFF2-40B4-BE49-F238E27FC236}">
+                  <a16:creationId xmlns:a16="http://schemas.microsoft.com/office/drawing/2014/main" id="{61FC23FF-5925-4BE6-8456-82F2744C759D}"/>
+                </a:ext>
+              </a:extLst>
+            </p:cNvPr>
+            <p:cNvPicPr>
+              <a:picLocks noChangeAspect="1"/>
+            </p:cNvPicPr>
+            <p:nvPr/>
+          </p:nvPicPr>
+          <p:blipFill>
+            <a:blip r:embed="rId10" cstate="print">
+              <a:extLst>
+                <a:ext uri="{28A0092B-C50C-407E-A947-70E740481C1C}">
+                  <a14:useLocalDpi xmlns:a14="http://schemas.microsoft.com/office/drawing/2010/main" val="0"/>
+                </a:ext>
+              </a:extLst>
+            </a:blip>
+            <a:stretch>
+              <a:fillRect/>
+            </a:stretch>
+          </p:blipFill>
+          <p:spPr>
+            <a:xfrm>
+              <a:off x="9737690" y="1188494"/>
+              <a:ext cx="1052623" cy="1207008"/>
+            </a:xfrm>
+            <a:prstGeom prst="rect">
+              <a:avLst/>
+            </a:prstGeom>
+          </p:spPr>
+        </p:pic>
+        <p:sp>
+          <p:nvSpPr>
+            <p:cNvPr id="35" name="TextBox 34">
+              <a:extLst>
+                <a:ext uri="{FF2B5EF4-FFF2-40B4-BE49-F238E27FC236}">
+                  <a16:creationId xmlns:a16="http://schemas.microsoft.com/office/drawing/2014/main" id="{B48E7CC3-12AF-4A4B-9EC2-6E54298C5AC7}"/>
+                </a:ext>
+              </a:extLst>
+            </p:cNvPr>
+            <p:cNvSpPr txBox="1"/>
+            <p:nvPr/>
+          </p:nvSpPr>
+          <p:spPr>
+            <a:xfrm>
+              <a:off x="9767711" y="2395502"/>
+              <a:ext cx="992580" cy="590931"/>
+            </a:xfrm>
+            <a:prstGeom prst="rect">
+              <a:avLst/>
+            </a:prstGeom>
+            <a:noFill/>
+          </p:spPr>
+          <p:txBody>
+            <a:bodyPr wrap="none" rtlCol="0">
+              <a:spAutoFit/>
+            </a:bodyPr>
+            <a:lstStyle/>
+            <a:p>
+              <a:pPr algn="ctr">
+                <a:lnSpc>
+                  <a:spcPct val="90000"/>
+                </a:lnSpc>
+              </a:pPr>
+              <a:r>
+                <a:rPr lang="en-US" dirty="0" err="1"/>
+                <a:t>Boyana</a:t>
+              </a:r>
+              <a:endParaRPr lang="en-US" dirty="0"/>
+            </a:p>
+            <a:p>
+              <a:pPr algn="ctr">
+                <a:lnSpc>
+                  <a:spcPct val="90000"/>
+                </a:lnSpc>
+              </a:pPr>
+              <a:r>
+                <a:rPr lang="en-US" i="1" dirty="0"/>
+                <a:t>she/her</a:t>
+              </a:r>
+            </a:p>
+          </p:txBody>
+        </p:sp>
+      </p:grpSp>
     </p:spTree>
     <p:extLst>
       <p:ext uri="{BB962C8B-B14F-4D97-AF65-F5344CB8AC3E}">
@@ -5538,12 +5647,9 @@
 </file>
 
 <file path=customXml/item1.xml><?xml version="1.0" encoding="utf-8"?>
-<?mso-contentType ?>
-<FormTemplates xmlns="http://schemas.microsoft.com/sharepoint/v3/contenttype/forms">
-  <Display>DocumentLibraryForm</Display>
-  <Edit>DocumentLibraryForm</Edit>
-  <New>DocumentLibraryForm</New>
-</FormTemplates>
+<p:properties xmlns:p="http://schemas.microsoft.com/office/2006/metadata/properties" xmlns:xsi="http://www.w3.org/2001/XMLSchema-instance" xmlns:pc="http://schemas.microsoft.com/office/infopath/2007/PartnerControls">
+  <documentManagement/>
+</p:properties>
 </file>
 
 <file path=customXml/item2.xml><?xml version="1.0" encoding="utf-8"?>
@@ -5596,15 +5702,25 @@
 </file>
 
 <file path=customXml/item3.xml><?xml version="1.0" encoding="utf-8"?>
-<p:properties xmlns:p="http://schemas.microsoft.com/office/2006/metadata/properties" xmlns:xsi="http://www.w3.org/2001/XMLSchema-instance" xmlns:pc="http://schemas.microsoft.com/office/infopath/2007/PartnerControls">
-  <documentManagement/>
-</p:properties>
+<?mso-contentType ?>
+<FormTemplates xmlns="http://schemas.microsoft.com/sharepoint/v3/contenttype/forms">
+  <Display>DocumentLibraryForm</Display>
+  <Edit>DocumentLibraryForm</Edit>
+  <New>DocumentLibraryForm</New>
+</FormTemplates>
 </file>
 
 <file path=customXml/itemProps1.xml><?xml version="1.0" encoding="utf-8"?>
-<ds:datastoreItem xmlns:ds="http://schemas.openxmlformats.org/officeDocument/2006/customXml" ds:itemID="{19E20559-B232-4371-8690-E3D8007EDB82}">
+<ds:datastoreItem xmlns:ds="http://schemas.openxmlformats.org/officeDocument/2006/customXml" ds:itemID="{A50EC660-24D0-43A0-AE5E-E274115E726B}">
   <ds:schemaRefs>
-    <ds:schemaRef ds:uri="http://schemas.microsoft.com/sharepoint/v3/contenttype/forms"/>
+    <ds:schemaRef ds:uri="http://purl.org/dc/elements/1.1/"/>
+    <ds:schemaRef ds:uri="http://schemas.microsoft.com/office/2006/metadata/properties"/>
+    <ds:schemaRef ds:uri="http://purl.org/dc/terms/"/>
+    <ds:schemaRef ds:uri="http://schemas.openxmlformats.org/package/2006/metadata/core-properties"/>
+    <ds:schemaRef ds:uri="http://schemas.microsoft.com/office/2006/documentManagement/types"/>
+    <ds:schemaRef ds:uri="http://www.w3.org/XML/1998/namespace"/>
+    <ds:schemaRef ds:uri="http://purl.org/dc/dcmitype/"/>
+    <ds:schemaRef ds:uri="http://schemas.microsoft.com/office/infopath/2007/PartnerControls"/>
   </ds:schemaRefs>
 </ds:datastoreItem>
 </file>
@@ -5625,16 +5741,9 @@
 </file>
 
 <file path=customXml/itemProps3.xml><?xml version="1.0" encoding="utf-8"?>
-<ds:datastoreItem xmlns:ds="http://schemas.openxmlformats.org/officeDocument/2006/customXml" ds:itemID="{A50EC660-24D0-43A0-AE5E-E274115E726B}">
+<ds:datastoreItem xmlns:ds="http://schemas.openxmlformats.org/officeDocument/2006/customXml" ds:itemID="{19E20559-B232-4371-8690-E3D8007EDB82}">
   <ds:schemaRefs>
-    <ds:schemaRef ds:uri="http://purl.org/dc/elements/1.1/"/>
-    <ds:schemaRef ds:uri="http://schemas.microsoft.com/office/2006/metadata/properties"/>
-    <ds:schemaRef ds:uri="http://purl.org/dc/terms/"/>
-    <ds:schemaRef ds:uri="http://schemas.openxmlformats.org/package/2006/metadata/core-properties"/>
-    <ds:schemaRef ds:uri="http://schemas.microsoft.com/office/2006/documentManagement/types"/>
-    <ds:schemaRef ds:uri="http://www.w3.org/XML/1998/namespace"/>
-    <ds:schemaRef ds:uri="http://purl.org/dc/dcmitype/"/>
-    <ds:schemaRef ds:uri="http://schemas.microsoft.com/office/infopath/2007/PartnerControls"/>
+    <ds:schemaRef ds:uri="http://schemas.microsoft.com/sharepoint/v3/contenttype/forms"/>
   </ds:schemaRefs>
 </ds:datastoreItem>
 </file>
</xml_diff>

<commit_message>
Head shots, updated intro for ATPESC
</commit_message>
<xml_diff>
--- a/head-shots/gallery.pptx
+++ b/head-shots/gallery.pptx
@@ -267,7 +267,7 @@
           <a:p>
             <a:fld id="{0B842F42-2CE9-4E35-95C1-410DC08A50B1}" type="datetimeFigureOut">
               <a:rPr lang="en-US" smtClean="0"/>
-              <a:t>7/26/2022</a:t>
+              <a:t>8/2/2022</a:t>
             </a:fld>
             <a:endParaRPr lang="en-US"/>
           </a:p>
@@ -432,7 +432,7 @@
           <a:p>
             <a:fld id="{6F282904-F315-4730-8D91-37D99E141A6F}" type="datetimeFigureOut">
               <a:rPr lang="en-US" smtClean="0"/>
-              <a:t>7/26/2022</a:t>
+              <a:t>8/2/2022</a:t>
             </a:fld>
             <a:endParaRPr lang="en-US"/>
           </a:p>
@@ -3553,7 +3553,7 @@
         </p:nvGrpSpPr>
         <p:grpSpPr>
           <a:xfrm>
-            <a:off x="2818231" y="1192331"/>
+            <a:off x="2719375" y="228496"/>
             <a:ext cx="1009507" cy="1851663"/>
             <a:chOff x="8066531" y="1374891"/>
             <a:chExt cx="1009507" cy="1851663"/>
@@ -3660,7 +3660,7 @@
         </p:nvGrpSpPr>
         <p:grpSpPr>
           <a:xfrm>
-            <a:off x="3955887" y="1192331"/>
+            <a:off x="3857031" y="228496"/>
             <a:ext cx="1009507" cy="1851663"/>
             <a:chOff x="9969639" y="348151"/>
             <a:chExt cx="1009507" cy="1851663"/>
@@ -3768,7 +3768,7 @@
         </p:nvGrpSpPr>
         <p:grpSpPr>
           <a:xfrm>
-            <a:off x="5093543" y="1192331"/>
+            <a:off x="4994687" y="228496"/>
             <a:ext cx="1124923" cy="1851663"/>
             <a:chOff x="10145555" y="1410772"/>
             <a:chExt cx="1124923" cy="1851663"/>
@@ -3875,7 +3875,7 @@
         </p:nvGrpSpPr>
         <p:grpSpPr>
           <a:xfrm>
-            <a:off x="6346615" y="1192331"/>
+            <a:off x="6247759" y="228496"/>
             <a:ext cx="1005403" cy="1805497"/>
             <a:chOff x="10526802" y="1346049"/>
             <a:chExt cx="1005403" cy="1805497"/>
@@ -3982,7 +3982,7 @@
         </p:nvGrpSpPr>
         <p:grpSpPr>
           <a:xfrm>
-            <a:off x="1735975" y="1192331"/>
+            <a:off x="1637119" y="228496"/>
             <a:ext cx="954107" cy="1805497"/>
             <a:chOff x="6614147" y="1346049"/>
             <a:chExt cx="954107" cy="1805497"/>
@@ -4090,7 +4090,7 @@
         </p:nvGrpSpPr>
         <p:grpSpPr>
           <a:xfrm>
-            <a:off x="8612576" y="1190412"/>
+            <a:off x="8513720" y="226577"/>
             <a:ext cx="1038027" cy="1796021"/>
             <a:chOff x="7480167" y="1192331"/>
             <a:chExt cx="1038027" cy="1796021"/>
@@ -4198,7 +4198,7 @@
         </p:nvGrpSpPr>
         <p:grpSpPr>
           <a:xfrm>
-            <a:off x="6377357" y="3154610"/>
+            <a:off x="6278501" y="2190775"/>
             <a:ext cx="933420" cy="1805497"/>
             <a:chOff x="10562794" y="1346049"/>
             <a:chExt cx="933420" cy="1805497"/>
@@ -4305,7 +4305,7 @@
         </p:nvGrpSpPr>
         <p:grpSpPr>
           <a:xfrm>
-            <a:off x="7452641" y="1190412"/>
+            <a:off x="7353785" y="226577"/>
             <a:ext cx="1038027" cy="1804941"/>
             <a:chOff x="9222950" y="1485878"/>
             <a:chExt cx="1038027" cy="1804941"/>
@@ -4412,7 +4412,7 @@
         </p:nvGrpSpPr>
         <p:grpSpPr>
           <a:xfrm>
-            <a:off x="568099" y="1189493"/>
+            <a:off x="469243" y="225658"/>
             <a:ext cx="1038027" cy="1796940"/>
             <a:chOff x="2690082" y="4212393"/>
             <a:chExt cx="1038027" cy="1796940"/>
@@ -4519,7 +4519,7 @@
         </p:nvGrpSpPr>
         <p:grpSpPr>
           <a:xfrm>
-            <a:off x="545375" y="3154610"/>
+            <a:off x="446519" y="2190775"/>
             <a:ext cx="1038027" cy="1797939"/>
             <a:chOff x="4187619" y="4211394"/>
             <a:chExt cx="1038027" cy="1797939"/>
@@ -4626,7 +4626,7 @@
         </p:nvGrpSpPr>
         <p:grpSpPr>
           <a:xfrm>
-            <a:off x="9737690" y="1188494"/>
+            <a:off x="9638834" y="224659"/>
             <a:ext cx="1052623" cy="1797939"/>
             <a:chOff x="9737690" y="1188494"/>
             <a:chExt cx="1052623" cy="1797939"/>
@@ -4716,6 +4716,220 @@
               <a:r>
                 <a:rPr lang="en-US" i="1" dirty="0"/>
                 <a:t>she/her</a:t>
+              </a:r>
+            </a:p>
+          </p:txBody>
+        </p:sp>
+      </p:grpSp>
+      <p:grpSp>
+        <p:nvGrpSpPr>
+          <p:cNvPr id="21" name="Group 20">
+            <a:extLst>
+              <a:ext uri="{FF2B5EF4-FFF2-40B4-BE49-F238E27FC236}">
+                <a16:creationId xmlns:a16="http://schemas.microsoft.com/office/drawing/2014/main" id="{A9A82307-839D-402C-B137-29C96B0CEBC7}"/>
+              </a:ext>
+            </a:extLst>
+          </p:cNvPr>
+          <p:cNvGrpSpPr/>
+          <p:nvPr/>
+        </p:nvGrpSpPr>
+        <p:grpSpPr>
+          <a:xfrm>
+            <a:off x="10858975" y="233579"/>
+            <a:ext cx="1021881" cy="1792821"/>
+            <a:chOff x="10957831" y="1197414"/>
+            <a:chExt cx="1021881" cy="1792821"/>
+          </a:xfrm>
+        </p:grpSpPr>
+        <p:pic>
+          <p:nvPicPr>
+            <p:cNvPr id="19" name="Picture 18" descr="A person smiling for the camera&#10;&#10;Description automatically generated with medium confidence">
+              <a:extLst>
+                <a:ext uri="{FF2B5EF4-FFF2-40B4-BE49-F238E27FC236}">
+                  <a16:creationId xmlns:a16="http://schemas.microsoft.com/office/drawing/2014/main" id="{1FB0BD36-6136-4B73-B15C-9812C86A7057}"/>
+                </a:ext>
+              </a:extLst>
+            </p:cNvPr>
+            <p:cNvPicPr>
+              <a:picLocks noChangeAspect="1"/>
+            </p:cNvPicPr>
+            <p:nvPr/>
+          </p:nvPicPr>
+          <p:blipFill rotWithShape="1">
+            <a:blip r:embed="rId11" cstate="print">
+              <a:extLst>
+                <a:ext uri="{28A0092B-C50C-407E-A947-70E740481C1C}">
+                  <a14:useLocalDpi xmlns:a14="http://schemas.microsoft.com/office/drawing/2010/main" val="0"/>
+                </a:ext>
+              </a:extLst>
+            </a:blip>
+            <a:srcRect l="6373" r="8964"/>
+            <a:stretch/>
+          </p:blipFill>
+          <p:spPr>
+            <a:xfrm>
+              <a:off x="10957831" y="1197414"/>
+              <a:ext cx="1021881" cy="1207008"/>
+            </a:xfrm>
+            <a:prstGeom prst="rect">
+              <a:avLst/>
+            </a:prstGeom>
+          </p:spPr>
+        </p:pic>
+        <p:sp>
+          <p:nvSpPr>
+            <p:cNvPr id="44" name="TextBox 43">
+              <a:extLst>
+                <a:ext uri="{FF2B5EF4-FFF2-40B4-BE49-F238E27FC236}">
+                  <a16:creationId xmlns:a16="http://schemas.microsoft.com/office/drawing/2014/main" id="{AC6E194C-62DB-4CBC-B240-B0D8FFBFEA07}"/>
+                </a:ext>
+              </a:extLst>
+            </p:cNvPr>
+            <p:cNvSpPr txBox="1"/>
+            <p:nvPr/>
+          </p:nvSpPr>
+          <p:spPr>
+            <a:xfrm>
+              <a:off x="11030189" y="2399304"/>
+              <a:ext cx="877164" cy="590931"/>
+            </a:xfrm>
+            <a:prstGeom prst="rect">
+              <a:avLst/>
+            </a:prstGeom>
+            <a:noFill/>
+          </p:spPr>
+          <p:txBody>
+            <a:bodyPr wrap="none" rtlCol="0">
+              <a:spAutoFit/>
+            </a:bodyPr>
+            <a:lstStyle/>
+            <a:p>
+              <a:pPr algn="ctr">
+                <a:lnSpc>
+                  <a:spcPct val="90000"/>
+                </a:lnSpc>
+              </a:pPr>
+              <a:r>
+                <a:rPr lang="en-US" dirty="0"/>
+                <a:t>Todd</a:t>
+              </a:r>
+            </a:p>
+            <a:p>
+              <a:pPr algn="ctr">
+                <a:lnSpc>
+                  <a:spcPct val="90000"/>
+                </a:lnSpc>
+              </a:pPr>
+              <a:r>
+                <a:rPr lang="en-US" i="1" dirty="0"/>
+                <a:t>he/him</a:t>
+              </a:r>
+            </a:p>
+          </p:txBody>
+        </p:sp>
+      </p:grpSp>
+      <p:grpSp>
+        <p:nvGrpSpPr>
+          <p:cNvPr id="22" name="Group 21">
+            <a:extLst>
+              <a:ext uri="{FF2B5EF4-FFF2-40B4-BE49-F238E27FC236}">
+                <a16:creationId xmlns:a16="http://schemas.microsoft.com/office/drawing/2014/main" id="{E97D8081-177A-465A-A0F6-A1EF1BF4CFE4}"/>
+              </a:ext>
+            </a:extLst>
+          </p:cNvPr>
+          <p:cNvGrpSpPr/>
+          <p:nvPr/>
+        </p:nvGrpSpPr>
+        <p:grpSpPr>
+          <a:xfrm>
+            <a:off x="446519" y="4155892"/>
+            <a:ext cx="1038027" cy="1797939"/>
+            <a:chOff x="9605157" y="3871568"/>
+            <a:chExt cx="1038027" cy="1797939"/>
+          </a:xfrm>
+        </p:grpSpPr>
+        <p:pic>
+          <p:nvPicPr>
+            <p:cNvPr id="16" name="Picture 15" descr="A person wearing glasses&#10;&#10;Description automatically generated with medium confidence">
+              <a:extLst>
+                <a:ext uri="{FF2B5EF4-FFF2-40B4-BE49-F238E27FC236}">
+                  <a16:creationId xmlns:a16="http://schemas.microsoft.com/office/drawing/2014/main" id="{9C876332-DFBD-4693-BD65-2663DB6507AF}"/>
+                </a:ext>
+              </a:extLst>
+            </p:cNvPr>
+            <p:cNvPicPr>
+              <a:picLocks noChangeAspect="1"/>
+            </p:cNvPicPr>
+            <p:nvPr/>
+          </p:nvPicPr>
+          <p:blipFill rotWithShape="1">
+            <a:blip r:embed="rId12" cstate="print">
+              <a:extLst>
+                <a:ext uri="{28A0092B-C50C-407E-A947-70E740481C1C}">
+                  <a14:useLocalDpi xmlns:a14="http://schemas.microsoft.com/office/drawing/2010/main" val="0"/>
+                </a:ext>
+              </a:extLst>
+            </a:blip>
+            <a:srcRect l="4297" r="9701"/>
+            <a:stretch/>
+          </p:blipFill>
+          <p:spPr>
+            <a:xfrm>
+              <a:off x="9605157" y="3871568"/>
+              <a:ext cx="1038027" cy="1207008"/>
+            </a:xfrm>
+            <a:prstGeom prst="rect">
+              <a:avLst/>
+            </a:prstGeom>
+          </p:spPr>
+        </p:pic>
+        <p:sp>
+          <p:nvSpPr>
+            <p:cNvPr id="47" name="TextBox 46">
+              <a:extLst>
+                <a:ext uri="{FF2B5EF4-FFF2-40B4-BE49-F238E27FC236}">
+                  <a16:creationId xmlns:a16="http://schemas.microsoft.com/office/drawing/2014/main" id="{8ABA8C48-FAAE-44DF-A09D-78904CB9EC71}"/>
+                </a:ext>
+              </a:extLst>
+            </p:cNvPr>
+            <p:cNvSpPr txBox="1"/>
+            <p:nvPr/>
+          </p:nvSpPr>
+          <p:spPr>
+            <a:xfrm>
+              <a:off x="9685588" y="5078576"/>
+              <a:ext cx="877164" cy="590931"/>
+            </a:xfrm>
+            <a:prstGeom prst="rect">
+              <a:avLst/>
+            </a:prstGeom>
+            <a:noFill/>
+          </p:spPr>
+          <p:txBody>
+            <a:bodyPr wrap="none" rtlCol="0">
+              <a:spAutoFit/>
+            </a:bodyPr>
+            <a:lstStyle/>
+            <a:p>
+              <a:pPr algn="ctr">
+                <a:lnSpc>
+                  <a:spcPct val="90000"/>
+                </a:lnSpc>
+              </a:pPr>
+              <a:r>
+                <a:rPr lang="en-US" dirty="0"/>
+                <a:t>Jared</a:t>
+              </a:r>
+            </a:p>
+            <a:p>
+              <a:pPr algn="ctr">
+                <a:lnSpc>
+                  <a:spcPct val="90000"/>
+                </a:lnSpc>
+              </a:pPr>
+              <a:r>
+                <a:rPr lang="en-US" i="1" dirty="0"/>
+                <a:t>he/him</a:t>
               </a:r>
             </a:p>
           </p:txBody>
@@ -5647,9 +5861,12 @@
 </file>
 
 <file path=customXml/item1.xml><?xml version="1.0" encoding="utf-8"?>
-<p:properties xmlns:p="http://schemas.microsoft.com/office/2006/metadata/properties" xmlns:xsi="http://www.w3.org/2001/XMLSchema-instance" xmlns:pc="http://schemas.microsoft.com/office/infopath/2007/PartnerControls">
-  <documentManagement/>
-</p:properties>
+<?mso-contentType ?>
+<FormTemplates xmlns="http://schemas.microsoft.com/sharepoint/v3/contenttype/forms">
+  <Display>DocumentLibraryForm</Display>
+  <Edit>DocumentLibraryForm</Edit>
+  <New>DocumentLibraryForm</New>
+</FormTemplates>
 </file>
 
 <file path=customXml/item2.xml><?xml version="1.0" encoding="utf-8"?>
@@ -5702,25 +5919,15 @@
 </file>
 
 <file path=customXml/item3.xml><?xml version="1.0" encoding="utf-8"?>
-<?mso-contentType ?>
-<FormTemplates xmlns="http://schemas.microsoft.com/sharepoint/v3/contenttype/forms">
-  <Display>DocumentLibraryForm</Display>
-  <Edit>DocumentLibraryForm</Edit>
-  <New>DocumentLibraryForm</New>
-</FormTemplates>
+<p:properties xmlns:p="http://schemas.microsoft.com/office/2006/metadata/properties" xmlns:xsi="http://www.w3.org/2001/XMLSchema-instance" xmlns:pc="http://schemas.microsoft.com/office/infopath/2007/PartnerControls">
+  <documentManagement/>
+</p:properties>
 </file>
 
 <file path=customXml/itemProps1.xml><?xml version="1.0" encoding="utf-8"?>
-<ds:datastoreItem xmlns:ds="http://schemas.openxmlformats.org/officeDocument/2006/customXml" ds:itemID="{A50EC660-24D0-43A0-AE5E-E274115E726B}">
+<ds:datastoreItem xmlns:ds="http://schemas.openxmlformats.org/officeDocument/2006/customXml" ds:itemID="{19E20559-B232-4371-8690-E3D8007EDB82}">
   <ds:schemaRefs>
-    <ds:schemaRef ds:uri="http://purl.org/dc/elements/1.1/"/>
-    <ds:schemaRef ds:uri="http://schemas.microsoft.com/office/2006/metadata/properties"/>
-    <ds:schemaRef ds:uri="http://purl.org/dc/terms/"/>
-    <ds:schemaRef ds:uri="http://schemas.openxmlformats.org/package/2006/metadata/core-properties"/>
-    <ds:schemaRef ds:uri="http://schemas.microsoft.com/office/2006/documentManagement/types"/>
-    <ds:schemaRef ds:uri="http://www.w3.org/XML/1998/namespace"/>
-    <ds:schemaRef ds:uri="http://purl.org/dc/dcmitype/"/>
-    <ds:schemaRef ds:uri="http://schemas.microsoft.com/office/infopath/2007/PartnerControls"/>
+    <ds:schemaRef ds:uri="http://schemas.microsoft.com/sharepoint/v3/contenttype/forms"/>
   </ds:schemaRefs>
 </ds:datastoreItem>
 </file>
@@ -5741,9 +5948,16 @@
 </file>
 
 <file path=customXml/itemProps3.xml><?xml version="1.0" encoding="utf-8"?>
-<ds:datastoreItem xmlns:ds="http://schemas.openxmlformats.org/officeDocument/2006/customXml" ds:itemID="{19E20559-B232-4371-8690-E3D8007EDB82}">
+<ds:datastoreItem xmlns:ds="http://schemas.openxmlformats.org/officeDocument/2006/customXml" ds:itemID="{A50EC660-24D0-43A0-AE5E-E274115E726B}">
   <ds:schemaRefs>
-    <ds:schemaRef ds:uri="http://schemas.microsoft.com/sharepoint/v3/contenttype/forms"/>
+    <ds:schemaRef ds:uri="http://purl.org/dc/elements/1.1/"/>
+    <ds:schemaRef ds:uri="http://schemas.microsoft.com/office/2006/metadata/properties"/>
+    <ds:schemaRef ds:uri="http://purl.org/dc/terms/"/>
+    <ds:schemaRef ds:uri="http://schemas.openxmlformats.org/package/2006/metadata/core-properties"/>
+    <ds:schemaRef ds:uri="http://schemas.microsoft.com/office/2006/documentManagement/types"/>
+    <ds:schemaRef ds:uri="http://www.w3.org/XML/1998/namespace"/>
+    <ds:schemaRef ds:uri="http://purl.org/dc/dcmitype/"/>
+    <ds:schemaRef ds:uri="http://schemas.microsoft.com/office/infopath/2007/PartnerControls"/>
   </ds:schemaRefs>
 </ds:datastoreItem>
 </file>
</xml_diff>

<commit_message>
Added Greg Becker to the rogue's gallery
For ATPESC 2023
</commit_message>
<xml_diff>
--- a/head-shots/gallery.pptx
+++ b/head-shots/gallery.pptx
@@ -267,7 +267,7 @@
           <a:p>
             <a:fld id="{0B842F42-2CE9-4E35-95C1-410DC08A50B1}" type="datetimeFigureOut">
               <a:rPr lang="en-US" smtClean="0"/>
-              <a:t>8/2/2022</a:t>
+              <a:t>7/18/2023</a:t>
             </a:fld>
             <a:endParaRPr lang="en-US"/>
           </a:p>
@@ -432,7 +432,7 @@
           <a:p>
             <a:fld id="{6F282904-F315-4730-8D91-37D99E141A6F}" type="datetimeFigureOut">
               <a:rPr lang="en-US" smtClean="0"/>
-              <a:t>8/2/2022</a:t>
+              <a:t>7/18/2023</a:t>
             </a:fld>
             <a:endParaRPr lang="en-US"/>
           </a:p>
@@ -4360,8 +4360,8 @@
           </p:nvSpPr>
           <p:spPr>
             <a:xfrm>
-              <a:off x="9303381" y="2699888"/>
-              <a:ext cx="877164" cy="590931"/>
+              <a:off x="9252085" y="2699888"/>
+              <a:ext cx="979756" cy="590931"/>
             </a:xfrm>
             <a:prstGeom prst="rect">
               <a:avLst/>
@@ -4381,7 +4381,7 @@
               </a:pPr>
               <a:r>
                 <a:rPr lang="en-US" dirty="0"/>
-                <a:t>Greg</a:t>
+                <a:t>Greg W</a:t>
               </a:r>
             </a:p>
             <a:p>
@@ -4919,6 +4919,329 @@
               <a:r>
                 <a:rPr lang="en-US" dirty="0"/>
                 <a:t>Jared</a:t>
+              </a:r>
+            </a:p>
+            <a:p>
+              <a:pPr algn="ctr">
+                <a:lnSpc>
+                  <a:spcPct val="90000"/>
+                </a:lnSpc>
+              </a:pPr>
+              <a:r>
+                <a:rPr lang="en-US" i="1" dirty="0"/>
+                <a:t>he/him</a:t>
+              </a:r>
+            </a:p>
+          </p:txBody>
+        </p:sp>
+      </p:grpSp>
+      <p:grpSp>
+        <p:nvGrpSpPr>
+          <p:cNvPr id="23" name="Group 22">
+            <a:extLst>
+              <a:ext uri="{FF2B5EF4-FFF2-40B4-BE49-F238E27FC236}">
+                <a16:creationId xmlns:a16="http://schemas.microsoft.com/office/drawing/2014/main" id="{794B688C-7D39-D8EF-FF9C-A4062EBDFE8E}"/>
+              </a:ext>
+            </a:extLst>
+          </p:cNvPr>
+          <p:cNvGrpSpPr/>
+          <p:nvPr/>
+        </p:nvGrpSpPr>
+        <p:grpSpPr>
+          <a:xfrm>
+            <a:off x="7353785" y="2191331"/>
+            <a:ext cx="1038027" cy="1804941"/>
+            <a:chOff x="9222950" y="1485878"/>
+            <a:chExt cx="1038027" cy="1804941"/>
+          </a:xfrm>
+        </p:grpSpPr>
+        <p:pic>
+          <p:nvPicPr>
+            <p:cNvPr id="24" name="Picture 23" descr="A person wearing a hat&#10;&#10;Description automatically generated with medium confidence">
+              <a:extLst>
+                <a:ext uri="{FF2B5EF4-FFF2-40B4-BE49-F238E27FC236}">
+                  <a16:creationId xmlns:a16="http://schemas.microsoft.com/office/drawing/2014/main" id="{46DBD4B1-E3BF-5488-9A90-51844BC44C27}"/>
+                </a:ext>
+              </a:extLst>
+            </p:cNvPr>
+            <p:cNvPicPr>
+              <a:picLocks noChangeAspect="1"/>
+            </p:cNvPicPr>
+            <p:nvPr/>
+          </p:nvPicPr>
+          <p:blipFill rotWithShape="1">
+            <a:blip r:embed="rId8">
+              <a:extLst>
+                <a:ext uri="{28A0092B-C50C-407E-A947-70E740481C1C}">
+                  <a14:useLocalDpi xmlns:a14="http://schemas.microsoft.com/office/drawing/2010/main" val="0"/>
+                </a:ext>
+              </a:extLst>
+            </a:blip>
+            <a:srcRect l="7000" t="-1515" r="7000" b="1515"/>
+            <a:stretch/>
+          </p:blipFill>
+          <p:spPr>
+            <a:xfrm>
+              <a:off x="9222950" y="1485878"/>
+              <a:ext cx="1038027" cy="1207008"/>
+            </a:xfrm>
+            <a:prstGeom prst="rect">
+              <a:avLst/>
+            </a:prstGeom>
+          </p:spPr>
+        </p:pic>
+        <p:sp>
+          <p:nvSpPr>
+            <p:cNvPr id="36" name="TextBox 35">
+              <a:extLst>
+                <a:ext uri="{FF2B5EF4-FFF2-40B4-BE49-F238E27FC236}">
+                  <a16:creationId xmlns:a16="http://schemas.microsoft.com/office/drawing/2014/main" id="{0631B48A-C23F-9ADE-CBAE-EC20E3D809E8}"/>
+                </a:ext>
+              </a:extLst>
+            </p:cNvPr>
+            <p:cNvSpPr txBox="1"/>
+            <p:nvPr/>
+          </p:nvSpPr>
+          <p:spPr>
+            <a:xfrm>
+              <a:off x="9303381" y="2699888"/>
+              <a:ext cx="877164" cy="590931"/>
+            </a:xfrm>
+            <a:prstGeom prst="rect">
+              <a:avLst/>
+            </a:prstGeom>
+            <a:noFill/>
+          </p:spPr>
+          <p:txBody>
+            <a:bodyPr wrap="none" rtlCol="0">
+              <a:spAutoFit/>
+            </a:bodyPr>
+            <a:lstStyle/>
+            <a:p>
+              <a:pPr algn="ctr">
+                <a:lnSpc>
+                  <a:spcPct val="90000"/>
+                </a:lnSpc>
+              </a:pPr>
+              <a:r>
+                <a:rPr lang="en-US" dirty="0"/>
+                <a:t>Greg</a:t>
+              </a:r>
+            </a:p>
+            <a:p>
+              <a:pPr algn="ctr">
+                <a:lnSpc>
+                  <a:spcPct val="90000"/>
+                </a:lnSpc>
+              </a:pPr>
+              <a:r>
+                <a:rPr lang="en-US" i="1" dirty="0"/>
+                <a:t>he/him</a:t>
+              </a:r>
+            </a:p>
+          </p:txBody>
+        </p:sp>
+      </p:grpSp>
+      <p:grpSp>
+        <p:nvGrpSpPr>
+          <p:cNvPr id="43" name="Group 42">
+            <a:extLst>
+              <a:ext uri="{FF2B5EF4-FFF2-40B4-BE49-F238E27FC236}">
+                <a16:creationId xmlns:a16="http://schemas.microsoft.com/office/drawing/2014/main" id="{B607E941-9030-16A6-4EC2-A713CFE14539}"/>
+              </a:ext>
+            </a:extLst>
+          </p:cNvPr>
+          <p:cNvGrpSpPr/>
+          <p:nvPr/>
+        </p:nvGrpSpPr>
+        <p:grpSpPr>
+          <a:xfrm>
+            <a:off x="2719375" y="4155892"/>
+            <a:ext cx="965606" cy="1806323"/>
+            <a:chOff x="1655035" y="4155892"/>
+            <a:chExt cx="965606" cy="1806323"/>
+          </a:xfrm>
+        </p:grpSpPr>
+        <p:pic>
+          <p:nvPicPr>
+            <p:cNvPr id="18" name="Picture 17" descr="A person smiling for the camera&#10;&#10;Description automatically generated with medium confidence">
+              <a:extLst>
+                <a:ext uri="{FF2B5EF4-FFF2-40B4-BE49-F238E27FC236}">
+                  <a16:creationId xmlns:a16="http://schemas.microsoft.com/office/drawing/2014/main" id="{18935638-5EB1-E443-8D73-E5FACB81DD2F}"/>
+                </a:ext>
+              </a:extLst>
+            </p:cNvPr>
+            <p:cNvPicPr>
+              <a:picLocks noChangeAspect="1"/>
+            </p:cNvPicPr>
+            <p:nvPr/>
+          </p:nvPicPr>
+          <p:blipFill>
+            <a:blip r:embed="rId13">
+              <a:extLst>
+                <a:ext uri="{28A0092B-C50C-407E-A947-70E740481C1C}">
+                  <a14:useLocalDpi xmlns:a14="http://schemas.microsoft.com/office/drawing/2010/main" val="0"/>
+                </a:ext>
+              </a:extLst>
+            </a:blip>
+            <a:stretch>
+              <a:fillRect/>
+            </a:stretch>
+          </p:blipFill>
+          <p:spPr>
+            <a:xfrm>
+              <a:off x="1655035" y="4155892"/>
+              <a:ext cx="965606" cy="1207008"/>
+            </a:xfrm>
+            <a:prstGeom prst="rect">
+              <a:avLst/>
+            </a:prstGeom>
+          </p:spPr>
+        </p:pic>
+        <p:sp>
+          <p:nvSpPr>
+            <p:cNvPr id="37" name="TextBox 36">
+              <a:extLst>
+                <a:ext uri="{FF2B5EF4-FFF2-40B4-BE49-F238E27FC236}">
+                  <a16:creationId xmlns:a16="http://schemas.microsoft.com/office/drawing/2014/main" id="{05108F2B-DA83-FE09-6B37-0B78049B8A16}"/>
+                </a:ext>
+              </a:extLst>
+            </p:cNvPr>
+            <p:cNvSpPr txBox="1"/>
+            <p:nvPr/>
+          </p:nvSpPr>
+          <p:spPr>
+            <a:xfrm>
+              <a:off x="1680020" y="5371284"/>
+              <a:ext cx="915636" cy="590931"/>
+            </a:xfrm>
+            <a:prstGeom prst="rect">
+              <a:avLst/>
+            </a:prstGeom>
+            <a:noFill/>
+          </p:spPr>
+          <p:txBody>
+            <a:bodyPr wrap="none" rtlCol="0">
+              <a:spAutoFit/>
+            </a:bodyPr>
+            <a:lstStyle/>
+            <a:p>
+              <a:pPr algn="ctr">
+                <a:lnSpc>
+                  <a:spcPct val="90000"/>
+                </a:lnSpc>
+              </a:pPr>
+              <a:r>
+                <a:rPr lang="en-US" dirty="0"/>
+                <a:t>Greg B</a:t>
+              </a:r>
+            </a:p>
+            <a:p>
+              <a:pPr algn="ctr">
+                <a:lnSpc>
+                  <a:spcPct val="90000"/>
+                </a:lnSpc>
+              </a:pPr>
+              <a:r>
+                <a:rPr lang="en-US" i="1" dirty="0"/>
+                <a:t>he/him</a:t>
+              </a:r>
+            </a:p>
+          </p:txBody>
+        </p:sp>
+      </p:grpSp>
+      <p:grpSp>
+        <p:nvGrpSpPr>
+          <p:cNvPr id="48" name="Group 47">
+            <a:extLst>
+              <a:ext uri="{FF2B5EF4-FFF2-40B4-BE49-F238E27FC236}">
+                <a16:creationId xmlns:a16="http://schemas.microsoft.com/office/drawing/2014/main" id="{26767E22-80B0-711E-9938-B56936036233}"/>
+              </a:ext>
+            </a:extLst>
+          </p:cNvPr>
+          <p:cNvGrpSpPr/>
+          <p:nvPr/>
+        </p:nvGrpSpPr>
+        <p:grpSpPr>
+          <a:xfrm>
+            <a:off x="1637119" y="4155892"/>
+            <a:ext cx="965606" cy="1806323"/>
+            <a:chOff x="1655035" y="4155892"/>
+            <a:chExt cx="965606" cy="1806323"/>
+          </a:xfrm>
+        </p:grpSpPr>
+        <p:pic>
+          <p:nvPicPr>
+            <p:cNvPr id="49" name="Picture 48" descr="A person smiling for the camera&#10;&#10;Description automatically generated with medium confidence">
+              <a:extLst>
+                <a:ext uri="{FF2B5EF4-FFF2-40B4-BE49-F238E27FC236}">
+                  <a16:creationId xmlns:a16="http://schemas.microsoft.com/office/drawing/2014/main" id="{7B85A16D-CDA9-9AD3-3A2E-40A3FED75F15}"/>
+                </a:ext>
+              </a:extLst>
+            </p:cNvPr>
+            <p:cNvPicPr>
+              <a:picLocks noChangeAspect="1"/>
+            </p:cNvPicPr>
+            <p:nvPr/>
+          </p:nvPicPr>
+          <p:blipFill>
+            <a:blip r:embed="rId13">
+              <a:extLst>
+                <a:ext uri="{28A0092B-C50C-407E-A947-70E740481C1C}">
+                  <a14:useLocalDpi xmlns:a14="http://schemas.microsoft.com/office/drawing/2010/main" val="0"/>
+                </a:ext>
+              </a:extLst>
+            </a:blip>
+            <a:stretch>
+              <a:fillRect/>
+            </a:stretch>
+          </p:blipFill>
+          <p:spPr>
+            <a:xfrm>
+              <a:off x="1655035" y="4155892"/>
+              <a:ext cx="965606" cy="1207008"/>
+            </a:xfrm>
+            <a:prstGeom prst="rect">
+              <a:avLst/>
+            </a:prstGeom>
+          </p:spPr>
+        </p:pic>
+        <p:sp>
+          <p:nvSpPr>
+            <p:cNvPr id="50" name="TextBox 49">
+              <a:extLst>
+                <a:ext uri="{FF2B5EF4-FFF2-40B4-BE49-F238E27FC236}">
+                  <a16:creationId xmlns:a16="http://schemas.microsoft.com/office/drawing/2014/main" id="{13AC8664-0AC1-45ED-152C-7675ED5CB56D}"/>
+                </a:ext>
+              </a:extLst>
+            </p:cNvPr>
+            <p:cNvSpPr txBox="1"/>
+            <p:nvPr/>
+          </p:nvSpPr>
+          <p:spPr>
+            <a:xfrm>
+              <a:off x="1699256" y="5371284"/>
+              <a:ext cx="877163" cy="590931"/>
+            </a:xfrm>
+            <a:prstGeom prst="rect">
+              <a:avLst/>
+            </a:prstGeom>
+            <a:noFill/>
+          </p:spPr>
+          <p:txBody>
+            <a:bodyPr wrap="none" rtlCol="0">
+              <a:spAutoFit/>
+            </a:bodyPr>
+            <a:lstStyle/>
+            <a:p>
+              <a:pPr algn="ctr">
+                <a:lnSpc>
+                  <a:spcPct val="90000"/>
+                </a:lnSpc>
+              </a:pPr>
+              <a:r>
+                <a:rPr lang="en-US" dirty="0"/>
+                <a:t>Greg</a:t>
               </a:r>
             </a:p>
             <a:p>
@@ -5861,12 +6184,9 @@
 </file>
 
 <file path=customXml/item1.xml><?xml version="1.0" encoding="utf-8"?>
-<?mso-contentType ?>
-<FormTemplates xmlns="http://schemas.microsoft.com/sharepoint/v3/contenttype/forms">
-  <Display>DocumentLibraryForm</Display>
-  <Edit>DocumentLibraryForm</Edit>
-  <New>DocumentLibraryForm</New>
-</FormTemplates>
+<p:properties xmlns:p="http://schemas.microsoft.com/office/2006/metadata/properties" xmlns:xsi="http://www.w3.org/2001/XMLSchema-instance" xmlns:pc="http://schemas.microsoft.com/office/infopath/2007/PartnerControls">
+  <documentManagement/>
+</p:properties>
 </file>
 
 <file path=customXml/item2.xml><?xml version="1.0" encoding="utf-8"?>
@@ -5919,15 +6239,25 @@
 </file>
 
 <file path=customXml/item3.xml><?xml version="1.0" encoding="utf-8"?>
-<p:properties xmlns:p="http://schemas.microsoft.com/office/2006/metadata/properties" xmlns:xsi="http://www.w3.org/2001/XMLSchema-instance" xmlns:pc="http://schemas.microsoft.com/office/infopath/2007/PartnerControls">
-  <documentManagement/>
-</p:properties>
+<?mso-contentType ?>
+<FormTemplates xmlns="http://schemas.microsoft.com/sharepoint/v3/contenttype/forms">
+  <Display>DocumentLibraryForm</Display>
+  <Edit>DocumentLibraryForm</Edit>
+  <New>DocumentLibraryForm</New>
+</FormTemplates>
 </file>
 
 <file path=customXml/itemProps1.xml><?xml version="1.0" encoding="utf-8"?>
-<ds:datastoreItem xmlns:ds="http://schemas.openxmlformats.org/officeDocument/2006/customXml" ds:itemID="{19E20559-B232-4371-8690-E3D8007EDB82}">
+<ds:datastoreItem xmlns:ds="http://schemas.openxmlformats.org/officeDocument/2006/customXml" ds:itemID="{A50EC660-24D0-43A0-AE5E-E274115E726B}">
   <ds:schemaRefs>
-    <ds:schemaRef ds:uri="http://schemas.microsoft.com/sharepoint/v3/contenttype/forms"/>
+    <ds:schemaRef ds:uri="http://purl.org/dc/elements/1.1/"/>
+    <ds:schemaRef ds:uri="http://schemas.microsoft.com/office/2006/metadata/properties"/>
+    <ds:schemaRef ds:uri="http://purl.org/dc/terms/"/>
+    <ds:schemaRef ds:uri="http://schemas.openxmlformats.org/package/2006/metadata/core-properties"/>
+    <ds:schemaRef ds:uri="http://schemas.microsoft.com/office/2006/documentManagement/types"/>
+    <ds:schemaRef ds:uri="http://www.w3.org/XML/1998/namespace"/>
+    <ds:schemaRef ds:uri="http://purl.org/dc/dcmitype/"/>
+    <ds:schemaRef ds:uri="http://schemas.microsoft.com/office/infopath/2007/PartnerControls"/>
   </ds:schemaRefs>
 </ds:datastoreItem>
 </file>
@@ -5948,16 +6278,9 @@
 </file>
 
 <file path=customXml/itemProps3.xml><?xml version="1.0" encoding="utf-8"?>
-<ds:datastoreItem xmlns:ds="http://schemas.openxmlformats.org/officeDocument/2006/customXml" ds:itemID="{A50EC660-24D0-43A0-AE5E-E274115E726B}">
+<ds:datastoreItem xmlns:ds="http://schemas.openxmlformats.org/officeDocument/2006/customXml" ds:itemID="{19E20559-B232-4371-8690-E3D8007EDB82}">
   <ds:schemaRefs>
-    <ds:schemaRef ds:uri="http://purl.org/dc/elements/1.1/"/>
-    <ds:schemaRef ds:uri="http://schemas.microsoft.com/office/2006/metadata/properties"/>
-    <ds:schemaRef ds:uri="http://purl.org/dc/terms/"/>
-    <ds:schemaRef ds:uri="http://schemas.openxmlformats.org/package/2006/metadata/core-properties"/>
-    <ds:schemaRef ds:uri="http://schemas.microsoft.com/office/2006/documentManagement/types"/>
-    <ds:schemaRef ds:uri="http://www.w3.org/XML/1998/namespace"/>
-    <ds:schemaRef ds:uri="http://purl.org/dc/dcmitype/"/>
-    <ds:schemaRef ds:uri="http://schemas.microsoft.com/office/infopath/2007/PartnerControls"/>
+    <ds:schemaRef ds:uri="http://schemas.microsoft.com/sharepoint/v3/contenttype/forms"/>
   </ds:schemaRefs>
 </ds:datastoreItem>
 </file>
</xml_diff>